<commit_message>
changed timeline plot to without numbers
</commit_message>
<xml_diff>
--- a/Figures/3G_Readiness_Levelsblue.pptx
+++ b/Figures/3G_Readiness_Levelsblue.pptx
@@ -200,7 +200,7 @@
           <a:p>
             <a:fld id="{80A3C999-FE59-4204-AACC-0F8516F767C4}" type="datetimeFigureOut">
               <a:rPr lang="de-DE" smtClean="0"/>
-              <a:t>15.04.2019</a:t>
+              <a:t>23.04.2019</a:t>
             </a:fld>
             <a:endParaRPr lang="de-DE"/>
           </a:p>
@@ -683,7 +683,7 @@
           <a:p>
             <a:fld id="{A314A3EB-5E85-4AC0-8178-142E63516165}" type="datetimeFigureOut">
               <a:rPr lang="de-DE" smtClean="0"/>
-              <a:t>15.04.2019</a:t>
+              <a:t>23.04.2019</a:t>
             </a:fld>
             <a:endParaRPr lang="de-DE"/>
           </a:p>
@@ -853,7 +853,7 @@
           <a:p>
             <a:fld id="{A314A3EB-5E85-4AC0-8178-142E63516165}" type="datetimeFigureOut">
               <a:rPr lang="de-DE" smtClean="0"/>
-              <a:t>15.04.2019</a:t>
+              <a:t>23.04.2019</a:t>
             </a:fld>
             <a:endParaRPr lang="de-DE"/>
           </a:p>
@@ -1033,7 +1033,7 @@
           <a:p>
             <a:fld id="{A314A3EB-5E85-4AC0-8178-142E63516165}" type="datetimeFigureOut">
               <a:rPr lang="de-DE" smtClean="0"/>
-              <a:t>15.04.2019</a:t>
+              <a:t>23.04.2019</a:t>
             </a:fld>
             <a:endParaRPr lang="de-DE"/>
           </a:p>
@@ -1203,7 +1203,7 @@
           <a:p>
             <a:fld id="{A314A3EB-5E85-4AC0-8178-142E63516165}" type="datetimeFigureOut">
               <a:rPr lang="de-DE" smtClean="0"/>
-              <a:t>15.04.2019</a:t>
+              <a:t>23.04.2019</a:t>
             </a:fld>
             <a:endParaRPr lang="de-DE"/>
           </a:p>
@@ -1447,7 +1447,7 @@
           <a:p>
             <a:fld id="{A314A3EB-5E85-4AC0-8178-142E63516165}" type="datetimeFigureOut">
               <a:rPr lang="de-DE" smtClean="0"/>
-              <a:t>15.04.2019</a:t>
+              <a:t>23.04.2019</a:t>
             </a:fld>
             <a:endParaRPr lang="de-DE"/>
           </a:p>
@@ -1679,7 +1679,7 @@
           <a:p>
             <a:fld id="{A314A3EB-5E85-4AC0-8178-142E63516165}" type="datetimeFigureOut">
               <a:rPr lang="de-DE" smtClean="0"/>
-              <a:t>15.04.2019</a:t>
+              <a:t>23.04.2019</a:t>
             </a:fld>
             <a:endParaRPr lang="de-DE"/>
           </a:p>
@@ -2046,7 +2046,7 @@
           <a:p>
             <a:fld id="{A314A3EB-5E85-4AC0-8178-142E63516165}" type="datetimeFigureOut">
               <a:rPr lang="de-DE" smtClean="0"/>
-              <a:t>15.04.2019</a:t>
+              <a:t>23.04.2019</a:t>
             </a:fld>
             <a:endParaRPr lang="de-DE"/>
           </a:p>
@@ -2164,7 +2164,7 @@
           <a:p>
             <a:fld id="{A314A3EB-5E85-4AC0-8178-142E63516165}" type="datetimeFigureOut">
               <a:rPr lang="de-DE" smtClean="0"/>
-              <a:t>15.04.2019</a:t>
+              <a:t>23.04.2019</a:t>
             </a:fld>
             <a:endParaRPr lang="de-DE"/>
           </a:p>
@@ -2259,7 +2259,7 @@
           <a:p>
             <a:fld id="{A314A3EB-5E85-4AC0-8178-142E63516165}" type="datetimeFigureOut">
               <a:rPr lang="de-DE" smtClean="0"/>
-              <a:t>15.04.2019</a:t>
+              <a:t>23.04.2019</a:t>
             </a:fld>
             <a:endParaRPr lang="de-DE"/>
           </a:p>
@@ -2536,7 +2536,7 @@
           <a:p>
             <a:fld id="{A314A3EB-5E85-4AC0-8178-142E63516165}" type="datetimeFigureOut">
               <a:rPr lang="de-DE" smtClean="0"/>
-              <a:t>15.04.2019</a:t>
+              <a:t>23.04.2019</a:t>
             </a:fld>
             <a:endParaRPr lang="de-DE"/>
           </a:p>
@@ -2793,7 +2793,7 @@
           <a:p>
             <a:fld id="{A314A3EB-5E85-4AC0-8178-142E63516165}" type="datetimeFigureOut">
               <a:rPr lang="de-DE" smtClean="0"/>
-              <a:t>15.04.2019</a:t>
+              <a:t>23.04.2019</a:t>
             </a:fld>
             <a:endParaRPr lang="de-DE"/>
           </a:p>
@@ -3006,7 +3006,7 @@
           <a:p>
             <a:fld id="{A314A3EB-5E85-4AC0-8178-142E63516165}" type="datetimeFigureOut">
               <a:rPr lang="de-DE" smtClean="0"/>
-              <a:t>15.04.2019</a:t>
+              <a:t>23.04.2019</a:t>
             </a:fld>
             <a:endParaRPr lang="de-DE"/>
           </a:p>
@@ -5924,7 +5924,7 @@
         </p:nvSpPr>
         <p:spPr>
           <a:xfrm>
-            <a:off x="8655593" y="893119"/>
+            <a:off x="8655593" y="904005"/>
             <a:ext cx="1122813" cy="369332"/>
           </a:xfrm>
           <a:prstGeom prst="rect">
@@ -5982,7 +5982,7 @@
         </p:nvGrpSpPr>
         <p:grpSpPr>
           <a:xfrm>
-            <a:off x="8311588" y="186919"/>
+            <a:off x="8311588" y="197805"/>
             <a:ext cx="2029188" cy="1372683"/>
             <a:chOff x="8862378" y="85027"/>
             <a:chExt cx="2029188" cy="1372683"/>
@@ -6377,7 +6377,7 @@
           <p:spPr>
             <a:xfrm>
               <a:off x="8862378" y="1180711"/>
-              <a:ext cx="590226" cy="276999"/>
+              <a:ext cx="184731" cy="276999"/>
             </a:xfrm>
             <a:prstGeom prst="rect">
               <a:avLst/>
@@ -6390,10 +6390,6 @@
             </a:bodyPr>
             <a:lstStyle/>
             <a:p>
-              <a:r>
-                <a:rPr lang="de-DE" sz="1200" dirty="0" smtClean="0"/>
-                <a:t>5M€,$</a:t>
-              </a:r>
               <a:endParaRPr lang="de-DE" sz="1200" dirty="0"/>
             </a:p>
           </p:txBody>
@@ -6407,7 +6403,7 @@
           <p:spPr>
             <a:xfrm>
               <a:off x="9906645" y="1175414"/>
-              <a:ext cx="774571" cy="276999"/>
+              <a:ext cx="290464" cy="276999"/>
             </a:xfrm>
             <a:prstGeom prst="rect">
               <a:avLst/>
@@ -6426,7 +6422,7 @@
               </a:r>
               <a:r>
                 <a:rPr lang="de-DE" sz="1200" dirty="0" smtClean="0"/>
-                <a:t>  50M€,$</a:t>
+                <a:t>  </a:t>
               </a:r>
               <a:endParaRPr lang="de-DE" sz="1200" dirty="0"/>
             </a:p>

</xml_diff>